<commit_message>
add location of the git repo
</commit_message>
<xml_diff>
--- a/Day1/Python/python-intro.pptx
+++ b/Day1/Python/python-intro.pptx
@@ -129,6 +129,11 @@
       </a:defRPr>
     </a:lvl9pPr>
   </p:defaultTextStyle>
+  <p:extLst>
+    <p:ext uri="{EFAFB233-063F-42B5-8137-9DF3F51BA10A}">
+      <p15:sldGuideLst xmlns:p15="http://schemas.microsoft.com/office/powerpoint/2012/main"/>
+    </p:ext>
+  </p:extLst>
 </p:presentation>
 </file>
 
@@ -214,7 +219,7 @@
           <a:p>
             <a:fld id="{DDF3295B-C7FA-D349-A388-00CDC1337E59}" type="datetimeFigureOut">
               <a:rPr lang="en-US" smtClean="0"/>
-              <a:t>7/28/19</a:t>
+              <a:t>7/29/19</a:t>
             </a:fld>
             <a:endParaRPr lang="en-US"/>
           </a:p>
@@ -810,7 +815,7 @@
           <a:p>
             <a:fld id="{B61A3A27-C133-6544-A842-466D85963408}" type="datetimeFigureOut">
               <a:rPr lang="en-US" smtClean="0"/>
-              <a:t>7/28/19</a:t>
+              <a:t>7/29/19</a:t>
             </a:fld>
             <a:endParaRPr lang="en-US"/>
           </a:p>
@@ -1008,7 +1013,7 @@
           <a:p>
             <a:fld id="{B61A3A27-C133-6544-A842-466D85963408}" type="datetimeFigureOut">
               <a:rPr lang="en-US" smtClean="0"/>
-              <a:t>7/28/19</a:t>
+              <a:t>7/29/19</a:t>
             </a:fld>
             <a:endParaRPr lang="en-US"/>
           </a:p>
@@ -1216,7 +1221,7 @@
           <a:p>
             <a:fld id="{B61A3A27-C133-6544-A842-466D85963408}" type="datetimeFigureOut">
               <a:rPr lang="en-US" smtClean="0"/>
-              <a:t>7/28/19</a:t>
+              <a:t>7/29/19</a:t>
             </a:fld>
             <a:endParaRPr lang="en-US"/>
           </a:p>
@@ -1414,7 +1419,7 @@
           <a:p>
             <a:fld id="{B61A3A27-C133-6544-A842-466D85963408}" type="datetimeFigureOut">
               <a:rPr lang="en-US" smtClean="0"/>
-              <a:t>7/28/19</a:t>
+              <a:t>7/29/19</a:t>
             </a:fld>
             <a:endParaRPr lang="en-US"/>
           </a:p>
@@ -1689,7 +1694,7 @@
           <a:p>
             <a:fld id="{B61A3A27-C133-6544-A842-466D85963408}" type="datetimeFigureOut">
               <a:rPr lang="en-US" smtClean="0"/>
-              <a:t>7/28/19</a:t>
+              <a:t>7/29/19</a:t>
             </a:fld>
             <a:endParaRPr lang="en-US"/>
           </a:p>
@@ -1954,7 +1959,7 @@
           <a:p>
             <a:fld id="{B61A3A27-C133-6544-A842-466D85963408}" type="datetimeFigureOut">
               <a:rPr lang="en-US" smtClean="0"/>
-              <a:t>7/28/19</a:t>
+              <a:t>7/29/19</a:t>
             </a:fld>
             <a:endParaRPr lang="en-US"/>
           </a:p>
@@ -2366,7 +2371,7 @@
           <a:p>
             <a:fld id="{B61A3A27-C133-6544-A842-466D85963408}" type="datetimeFigureOut">
               <a:rPr lang="en-US" smtClean="0"/>
-              <a:t>7/28/19</a:t>
+              <a:t>7/29/19</a:t>
             </a:fld>
             <a:endParaRPr lang="en-US"/>
           </a:p>
@@ -2507,7 +2512,7 @@
           <a:p>
             <a:fld id="{B61A3A27-C133-6544-A842-466D85963408}" type="datetimeFigureOut">
               <a:rPr lang="en-US" smtClean="0"/>
-              <a:t>7/28/19</a:t>
+              <a:t>7/29/19</a:t>
             </a:fld>
             <a:endParaRPr lang="en-US"/>
           </a:p>
@@ -2620,7 +2625,7 @@
           <a:p>
             <a:fld id="{B61A3A27-C133-6544-A842-466D85963408}" type="datetimeFigureOut">
               <a:rPr lang="en-US" smtClean="0"/>
-              <a:t>7/28/19</a:t>
+              <a:t>7/29/19</a:t>
             </a:fld>
             <a:endParaRPr lang="en-US"/>
           </a:p>
@@ -2931,7 +2936,7 @@
           <a:p>
             <a:fld id="{B61A3A27-C133-6544-A842-466D85963408}" type="datetimeFigureOut">
               <a:rPr lang="en-US" smtClean="0"/>
-              <a:t>7/28/19</a:t>
+              <a:t>7/29/19</a:t>
             </a:fld>
             <a:endParaRPr lang="en-US"/>
           </a:p>
@@ -3219,7 +3224,7 @@
           <a:p>
             <a:fld id="{B61A3A27-C133-6544-A842-466D85963408}" type="datetimeFigureOut">
               <a:rPr lang="en-US" smtClean="0"/>
-              <a:t>7/28/19</a:t>
+              <a:t>7/29/19</a:t>
             </a:fld>
             <a:endParaRPr lang="en-US"/>
           </a:p>
@@ -3460,7 +3465,7 @@
           <a:p>
             <a:fld id="{B61A3A27-C133-6544-A842-466D85963408}" type="datetimeFigureOut">
               <a:rPr lang="en-US" smtClean="0"/>
-              <a:t>7/28/19</a:t>
+              <a:t>7/29/19</a:t>
             </a:fld>
             <a:endParaRPr lang="en-US"/>
           </a:p>
@@ -5554,8 +5559,8 @@
           </a:p>
         </p:txBody>
       </p:sp>
-      <mc:AlternateContent xmlns:mc="http://schemas.openxmlformats.org/markup-compatibility/2006">
-        <mc:Choice xmlns:a14="http://schemas.microsoft.com/office/drawing/2010/main" Requires="a14">
+      <mc:AlternateContent xmlns:mc="http://schemas.openxmlformats.org/markup-compatibility/2006" xmlns:a14="http://schemas.microsoft.com/office/drawing/2010/main">
+        <mc:Choice Requires="a14">
           <p:sp>
             <p:nvSpPr>
               <p:cNvPr id="4" name="TextBox 3">
@@ -5584,6 +5589,7 @@
               </a:bodyPr>
               <a:lstStyle/>
               <a:p>
+                <a:pPr/>
                 <a14:m>
                   <m:oMathPara xmlns:m="http://schemas.openxmlformats.org/officeDocument/2006/math">
                     <m:oMathParaPr>
@@ -5741,7 +5747,7 @@
             </p:txBody>
           </p:sp>
         </mc:Choice>
-        <mc:Fallback>
+        <mc:Fallback xmlns="">
           <p:sp>
             <p:nvSpPr>
               <p:cNvPr id="4" name="TextBox 3">
@@ -6207,6 +6213,65 @@
               <a:t>Class arrangement</a:t>
             </a:r>
           </a:p>
+          <a:p>
+            <a:r>
+              <a:rPr lang="en-US" dirty="0"/>
+              <a:t>Have working python (2 or 3), need </a:t>
+            </a:r>
+            <a:r>
+              <a:rPr lang="en-US" dirty="0" err="1"/>
+              <a:t>numpy</a:t>
+            </a:r>
+            <a:r>
+              <a:rPr lang="en-US" dirty="0"/>
+              <a:t>, </a:t>
+            </a:r>
+            <a:r>
+              <a:rPr lang="en-US" dirty="0" err="1"/>
+              <a:t>scipy</a:t>
+            </a:r>
+            <a:r>
+              <a:rPr lang="en-US" dirty="0"/>
+              <a:t>, matplotlib, pandas, seaborn</a:t>
+            </a:r>
+          </a:p>
+          <a:p>
+            <a:pPr lvl="1"/>
+            <a:r>
+              <a:rPr lang="en-US" dirty="0"/>
+              <a:t>Anaconda works well for instance</a:t>
+            </a:r>
+          </a:p>
+          <a:p>
+            <a:r>
+              <a:rPr lang="en-US" dirty="0"/>
+              <a:t>Clone the git repository with materials from the school:</a:t>
+            </a:r>
+          </a:p>
+          <a:p>
+            <a:pPr lvl="1"/>
+            <a:r>
+              <a:rPr lang="en-US" sz="2000" dirty="0"/>
+              <a:t>git clone </a:t>
+            </a:r>
+            <a:r>
+              <a:rPr lang="en-US" sz="2000" dirty="0">
+                <a:hlinkClick r:id="rId3"/>
+              </a:rPr>
+              <a:t>https://github.com/lkwagner/StochasticSchool.git</a:t>
+            </a:r>
+            <a:endParaRPr lang="en-US" sz="2000" dirty="0"/>
+          </a:p>
+          <a:p>
+            <a:pPr lvl="1"/>
+            <a:r>
+              <a:rPr lang="en-US" sz="2000" dirty="0"/>
+              <a:t>Everything from today is in Day1 (update frequently)</a:t>
+            </a:r>
+          </a:p>
+          <a:p>
+            <a:endParaRPr lang="en-US" dirty="0"/>
+          </a:p>
         </p:txBody>
       </p:sp>
     </p:spTree>
@@ -6825,8 +6890,8 @@
           </a:p>
         </p:txBody>
       </p:sp>
-      <mc:AlternateContent xmlns:mc="http://schemas.openxmlformats.org/markup-compatibility/2006">
-        <mc:Choice xmlns:a14="http://schemas.microsoft.com/office/drawing/2010/main" Requires="a14">
+      <mc:AlternateContent xmlns:mc="http://schemas.openxmlformats.org/markup-compatibility/2006" xmlns:a14="http://schemas.microsoft.com/office/drawing/2010/main">
+        <mc:Choice Requires="a14">
           <p:sp>
             <p:nvSpPr>
               <p:cNvPr id="3" name="Content Placeholder 2">
@@ -7015,7 +7080,7 @@
             </p:txBody>
           </p:sp>
         </mc:Choice>
-        <mc:Fallback>
+        <mc:Fallback xmlns="">
           <p:sp>
             <p:nvSpPr>
               <p:cNvPr id="3" name="Content Placeholder 2">

</xml_diff>